<commit_message>
Arreglar y añir tareas de innovacion
</commit_message>
<xml_diff>
--- a/Innovacion/1.3.2. Actividad Evaluación de Ideas.pptx
+++ b/Innovacion/1.3.2. Actividad Evaluación de Ideas.pptx
@@ -6057,19 +6057,7 @@
                 <a:cs typeface="Roboto"/>
                 <a:sym typeface="Roboto"/>
               </a:rPr>
-              <a:t>- Instalar </a:t>
-            </a:r>
-            <a:r>
-              <a:rPr lang="pt-BR" sz="1400" i="0" u="none" strike="noStrike" cap="none" dirty="0" err="1">
-                <a:solidFill>
-                  <a:schemeClr val="tx1"/>
-                </a:solidFill>
-                <a:latin typeface="Roboto"/>
-                <a:ea typeface="Roboto"/>
-                <a:cs typeface="Roboto"/>
-                <a:sym typeface="Roboto"/>
-              </a:rPr>
-              <a:t>hidroeléctricas</a:t>
+              <a:t>- Instalar hidroeléctricas</a:t>
             </a:r>
             <a:r>
               <a:rPr lang="pt-BR" dirty="0">
@@ -6081,55 +6069,7 @@
                 <a:cs typeface="Roboto"/>
                 <a:sym typeface="Roboto"/>
               </a:rPr>
-              <a:t> </a:t>
-            </a:r>
-            <a:r>
-              <a:rPr lang="pt-BR" dirty="0" err="1">
-                <a:solidFill>
-                  <a:schemeClr val="tx1"/>
-                </a:solidFill>
-                <a:latin typeface="Roboto"/>
-                <a:ea typeface="Roboto"/>
-                <a:cs typeface="Roboto"/>
-                <a:sym typeface="Roboto"/>
-              </a:rPr>
-              <a:t>con</a:t>
-            </a:r>
-            <a:r>
-              <a:rPr lang="pt-BR" dirty="0">
-                <a:solidFill>
-                  <a:schemeClr val="tx1"/>
-                </a:solidFill>
-                <a:latin typeface="Roboto"/>
-                <a:ea typeface="Roboto"/>
-                <a:cs typeface="Roboto"/>
-                <a:sym typeface="Roboto"/>
-              </a:rPr>
-              <a:t> </a:t>
-            </a:r>
-            <a:r>
-              <a:rPr lang="pt-BR" dirty="0" err="1">
-                <a:solidFill>
-                  <a:schemeClr val="tx1"/>
-                </a:solidFill>
-                <a:latin typeface="Roboto"/>
-                <a:ea typeface="Roboto"/>
-                <a:cs typeface="Roboto"/>
-                <a:sym typeface="Roboto"/>
-              </a:rPr>
-              <a:t>t</a:t>
-            </a:r>
-            <a:r>
-              <a:rPr lang="pt-BR" sz="1400" i="0" u="none" strike="noStrike" cap="none" dirty="0" err="1">
-                <a:solidFill>
-                  <a:schemeClr val="tx1"/>
-                </a:solidFill>
-                <a:latin typeface="Roboto"/>
-                <a:ea typeface="Roboto"/>
-                <a:cs typeface="Roboto"/>
-                <a:sym typeface="Roboto"/>
-              </a:rPr>
-              <a:t>ratamiento</a:t>
+              <a:t> con t</a:t>
             </a:r>
             <a:r>
               <a:rPr lang="pt-BR" sz="1400" i="0" u="none" strike="noStrike" cap="none" dirty="0">
@@ -6141,7 +6081,7 @@
                 <a:cs typeface="Roboto"/>
                 <a:sym typeface="Roboto"/>
               </a:rPr>
-              <a:t> de aguas</a:t>
+              <a:t>ratamiento de aguas</a:t>
             </a:r>
             <a:r>
               <a:rPr lang="pt-BR" dirty="0">
@@ -6193,31 +6133,7 @@
                 <a:cs typeface="Roboto"/>
                 <a:sym typeface="Roboto"/>
               </a:rPr>
-              <a:t>- Instalar </a:t>
-            </a:r>
-            <a:r>
-              <a:rPr lang="pt-BR" sz="1400" i="0" u="none" strike="noStrike" cap="none" dirty="0" err="1">
-                <a:solidFill>
-                  <a:schemeClr val="tx1"/>
-                </a:solidFill>
-                <a:latin typeface="Roboto"/>
-                <a:ea typeface="Roboto"/>
-                <a:cs typeface="Roboto"/>
-                <a:sym typeface="Roboto"/>
-              </a:rPr>
-              <a:t>paneles</a:t>
-            </a:r>
-            <a:r>
-              <a:rPr lang="pt-BR" sz="1400" i="0" u="none" strike="noStrike" cap="none" dirty="0">
-                <a:solidFill>
-                  <a:schemeClr val="tx1"/>
-                </a:solidFill>
-                <a:latin typeface="Roboto"/>
-                <a:ea typeface="Roboto"/>
-                <a:cs typeface="Roboto"/>
-                <a:sym typeface="Roboto"/>
-              </a:rPr>
-              <a:t> solares</a:t>
+              <a:t>- Instalar paneles solares</a:t>
             </a:r>
           </a:p>
           <a:p>
@@ -6370,101 +6286,8 @@
                 <a:cs typeface="Roboto"/>
                 <a:sym typeface="Roboto"/>
               </a:rPr>
-              <a:t>Pozos </a:t>
+              <a:t>Pozos profundos con bombas solares o eléctricas</a:t>
             </a:r>
-            <a:r>
-              <a:rPr lang="en-US" sz="1400" b="0" i="0" u="none" strike="noStrike" cap="none" dirty="0" err="1">
-                <a:solidFill>
-                  <a:schemeClr val="dk1"/>
-                </a:solidFill>
-                <a:latin typeface="Roboto"/>
-                <a:ea typeface="Roboto"/>
-                <a:cs typeface="Roboto"/>
-                <a:sym typeface="Roboto"/>
-              </a:rPr>
-              <a:t>profundos</a:t>
-            </a:r>
-            <a:r>
-              <a:rPr lang="en-US" sz="1400" b="0" i="0" u="none" strike="noStrike" cap="none" dirty="0">
-                <a:solidFill>
-                  <a:schemeClr val="dk1"/>
-                </a:solidFill>
-                <a:latin typeface="Roboto"/>
-                <a:ea typeface="Roboto"/>
-                <a:cs typeface="Roboto"/>
-                <a:sym typeface="Roboto"/>
-              </a:rPr>
-              <a:t> con </a:t>
-            </a:r>
-            <a:r>
-              <a:rPr lang="en-US" sz="1400" b="0" i="0" u="none" strike="noStrike" cap="none" dirty="0" err="1">
-                <a:solidFill>
-                  <a:schemeClr val="dk1"/>
-                </a:solidFill>
-                <a:latin typeface="Roboto"/>
-                <a:ea typeface="Roboto"/>
-                <a:cs typeface="Roboto"/>
-                <a:sym typeface="Roboto"/>
-              </a:rPr>
-              <a:t>bombas</a:t>
-            </a:r>
-            <a:r>
-              <a:rPr lang="en-US" sz="1400" b="0" i="0" u="none" strike="noStrike" cap="none" dirty="0">
-                <a:solidFill>
-                  <a:schemeClr val="dk1"/>
-                </a:solidFill>
-                <a:latin typeface="Roboto"/>
-                <a:ea typeface="Roboto"/>
-                <a:cs typeface="Roboto"/>
-                <a:sym typeface="Roboto"/>
-              </a:rPr>
-              <a:t> </a:t>
-            </a:r>
-            <a:r>
-              <a:rPr lang="en-US" sz="1400" b="0" i="0" u="none" strike="noStrike" cap="none" dirty="0" err="1">
-                <a:solidFill>
-                  <a:schemeClr val="dk1"/>
-                </a:solidFill>
-                <a:latin typeface="Roboto"/>
-                <a:ea typeface="Roboto"/>
-                <a:cs typeface="Roboto"/>
-                <a:sym typeface="Roboto"/>
-              </a:rPr>
-              <a:t>solares</a:t>
-            </a:r>
-            <a:r>
-              <a:rPr lang="en-US" sz="1400" b="0" i="0" u="none" strike="noStrike" cap="none" dirty="0">
-                <a:solidFill>
-                  <a:schemeClr val="dk1"/>
-                </a:solidFill>
-                <a:latin typeface="Roboto"/>
-                <a:ea typeface="Roboto"/>
-                <a:cs typeface="Roboto"/>
-                <a:sym typeface="Roboto"/>
-              </a:rPr>
-              <a:t> o </a:t>
-            </a:r>
-            <a:r>
-              <a:rPr lang="en-US" sz="1400" b="0" i="0" u="none" strike="noStrike" cap="none" dirty="0" err="1">
-                <a:solidFill>
-                  <a:schemeClr val="dk1"/>
-                </a:solidFill>
-                <a:latin typeface="Roboto"/>
-                <a:ea typeface="Roboto"/>
-                <a:cs typeface="Roboto"/>
-                <a:sym typeface="Roboto"/>
-              </a:rPr>
-              <a:t>eléctricas</a:t>
-            </a:r>
-            <a:endParaRPr lang="en-US" sz="1400" b="0" i="0" u="none" strike="noStrike" cap="none" dirty="0">
-              <a:solidFill>
-                <a:schemeClr val="dk1"/>
-              </a:solidFill>
-              <a:latin typeface="Roboto"/>
-              <a:ea typeface="Roboto"/>
-              <a:cs typeface="Roboto"/>
-              <a:sym typeface="Roboto"/>
-            </a:endParaRPr>
           </a:p>
           <a:p>
             <a:pPr marL="285750" marR="0" lvl="0" indent="-285750" algn="just" rtl="0">
@@ -6494,101 +6317,8 @@
                 <a:cs typeface="Roboto"/>
                 <a:sym typeface="Roboto"/>
               </a:rPr>
-              <a:t>Canales de </a:t>
+              <a:t>Canales de recolección desde cerros o vertientes</a:t>
             </a:r>
-            <a:r>
-              <a:rPr lang="en-US" sz="1400" b="0" i="0" u="none" strike="noStrike" cap="none" dirty="0" err="1">
-                <a:solidFill>
-                  <a:schemeClr val="dk1"/>
-                </a:solidFill>
-                <a:latin typeface="Roboto"/>
-                <a:ea typeface="Roboto"/>
-                <a:cs typeface="Roboto"/>
-                <a:sym typeface="Roboto"/>
-              </a:rPr>
-              <a:t>recolección</a:t>
-            </a:r>
-            <a:r>
-              <a:rPr lang="en-US" sz="1400" b="0" i="0" u="none" strike="noStrike" cap="none" dirty="0">
-                <a:solidFill>
-                  <a:schemeClr val="dk1"/>
-                </a:solidFill>
-                <a:latin typeface="Roboto"/>
-                <a:ea typeface="Roboto"/>
-                <a:cs typeface="Roboto"/>
-                <a:sym typeface="Roboto"/>
-              </a:rPr>
-              <a:t> </a:t>
-            </a:r>
-            <a:r>
-              <a:rPr lang="en-US" sz="1400" b="0" i="0" u="none" strike="noStrike" cap="none" dirty="0" err="1">
-                <a:solidFill>
-                  <a:schemeClr val="dk1"/>
-                </a:solidFill>
-                <a:latin typeface="Roboto"/>
-                <a:ea typeface="Roboto"/>
-                <a:cs typeface="Roboto"/>
-                <a:sym typeface="Roboto"/>
-              </a:rPr>
-              <a:t>desde</a:t>
-            </a:r>
-            <a:r>
-              <a:rPr lang="en-US" sz="1400" b="0" i="0" u="none" strike="noStrike" cap="none" dirty="0">
-                <a:solidFill>
-                  <a:schemeClr val="dk1"/>
-                </a:solidFill>
-                <a:latin typeface="Roboto"/>
-                <a:ea typeface="Roboto"/>
-                <a:cs typeface="Roboto"/>
-                <a:sym typeface="Roboto"/>
-              </a:rPr>
-              <a:t> </a:t>
-            </a:r>
-            <a:r>
-              <a:rPr lang="en-US" sz="1400" b="0" i="0" u="none" strike="noStrike" cap="none" dirty="0" err="1">
-                <a:solidFill>
-                  <a:schemeClr val="dk1"/>
-                </a:solidFill>
-                <a:latin typeface="Roboto"/>
-                <a:ea typeface="Roboto"/>
-                <a:cs typeface="Roboto"/>
-                <a:sym typeface="Roboto"/>
-              </a:rPr>
-              <a:t>cerros</a:t>
-            </a:r>
-            <a:r>
-              <a:rPr lang="en-US" sz="1400" b="0" i="0" u="none" strike="noStrike" cap="none" dirty="0">
-                <a:solidFill>
-                  <a:schemeClr val="dk1"/>
-                </a:solidFill>
-                <a:latin typeface="Roboto"/>
-                <a:ea typeface="Roboto"/>
-                <a:cs typeface="Roboto"/>
-                <a:sym typeface="Roboto"/>
-              </a:rPr>
-              <a:t> o </a:t>
-            </a:r>
-            <a:r>
-              <a:rPr lang="en-US" sz="1400" b="0" i="0" u="none" strike="noStrike" cap="none" dirty="0" err="1">
-                <a:solidFill>
-                  <a:schemeClr val="dk1"/>
-                </a:solidFill>
-                <a:latin typeface="Roboto"/>
-                <a:ea typeface="Roboto"/>
-                <a:cs typeface="Roboto"/>
-                <a:sym typeface="Roboto"/>
-              </a:rPr>
-              <a:t>vertientes</a:t>
-            </a:r>
-            <a:endParaRPr lang="en-US" sz="1400" b="0" i="0" u="none" strike="noStrike" cap="none" dirty="0">
-              <a:solidFill>
-                <a:schemeClr val="dk1"/>
-              </a:solidFill>
-              <a:latin typeface="Roboto"/>
-              <a:ea typeface="Roboto"/>
-              <a:cs typeface="Roboto"/>
-              <a:sym typeface="Roboto"/>
-            </a:endParaRPr>
           </a:p>
         </p:txBody>
       </p:sp>
@@ -6712,101 +6442,8 @@
                 <a:cs typeface="Roboto"/>
                 <a:sym typeface="Roboto"/>
               </a:rPr>
-              <a:t>- </a:t>
+              <a:t>- Purificadores de agua portátiles o comunitarios</a:t>
             </a:r>
-            <a:r>
-              <a:rPr lang="en-US" dirty="0" err="1">
-                <a:solidFill>
-                  <a:schemeClr val="dk1"/>
-                </a:solidFill>
-                <a:latin typeface="Roboto"/>
-                <a:ea typeface="Roboto"/>
-                <a:cs typeface="Roboto"/>
-                <a:sym typeface="Roboto"/>
-              </a:rPr>
-              <a:t>Purificadores</a:t>
-            </a:r>
-            <a:r>
-              <a:rPr lang="en-US" dirty="0">
-                <a:solidFill>
-                  <a:schemeClr val="dk1"/>
-                </a:solidFill>
-                <a:latin typeface="Roboto"/>
-                <a:ea typeface="Roboto"/>
-                <a:cs typeface="Roboto"/>
-                <a:sym typeface="Roboto"/>
-              </a:rPr>
-              <a:t> de </a:t>
-            </a:r>
-            <a:r>
-              <a:rPr lang="en-US" dirty="0" err="1">
-                <a:solidFill>
-                  <a:schemeClr val="dk1"/>
-                </a:solidFill>
-                <a:latin typeface="Roboto"/>
-                <a:ea typeface="Roboto"/>
-                <a:cs typeface="Roboto"/>
-                <a:sym typeface="Roboto"/>
-              </a:rPr>
-              <a:t>agua</a:t>
-            </a:r>
-            <a:r>
-              <a:rPr lang="en-US" dirty="0">
-                <a:solidFill>
-                  <a:schemeClr val="dk1"/>
-                </a:solidFill>
-                <a:latin typeface="Roboto"/>
-                <a:ea typeface="Roboto"/>
-                <a:cs typeface="Roboto"/>
-                <a:sym typeface="Roboto"/>
-              </a:rPr>
-              <a:t> </a:t>
-            </a:r>
-            <a:r>
-              <a:rPr lang="en-US" dirty="0" err="1">
-                <a:solidFill>
-                  <a:schemeClr val="dk1"/>
-                </a:solidFill>
-                <a:latin typeface="Roboto"/>
-                <a:ea typeface="Roboto"/>
-                <a:cs typeface="Roboto"/>
-                <a:sym typeface="Roboto"/>
-              </a:rPr>
-              <a:t>portátiles</a:t>
-            </a:r>
-            <a:r>
-              <a:rPr lang="en-US" dirty="0">
-                <a:solidFill>
-                  <a:schemeClr val="dk1"/>
-                </a:solidFill>
-                <a:latin typeface="Roboto"/>
-                <a:ea typeface="Roboto"/>
-                <a:cs typeface="Roboto"/>
-                <a:sym typeface="Roboto"/>
-              </a:rPr>
-              <a:t> o </a:t>
-            </a:r>
-            <a:r>
-              <a:rPr lang="en-US" dirty="0" err="1">
-                <a:solidFill>
-                  <a:schemeClr val="dk1"/>
-                </a:solidFill>
-                <a:latin typeface="Roboto"/>
-                <a:ea typeface="Roboto"/>
-                <a:cs typeface="Roboto"/>
-                <a:sym typeface="Roboto"/>
-              </a:rPr>
-              <a:t>comunitarios</a:t>
-            </a:r>
-            <a:endParaRPr lang="en-US" dirty="0">
-              <a:solidFill>
-                <a:schemeClr val="dk1"/>
-              </a:solidFill>
-              <a:latin typeface="Roboto"/>
-              <a:ea typeface="Roboto"/>
-              <a:cs typeface="Roboto"/>
-              <a:sym typeface="Roboto"/>
-            </a:endParaRPr>
           </a:p>
           <a:p>
             <a:pPr marL="0" marR="0" lvl="0" indent="0" algn="just" rtl="0">
@@ -6836,77 +6473,8 @@
                 <a:cs typeface="Roboto"/>
                 <a:sym typeface="Roboto"/>
               </a:rPr>
-              <a:t>- </a:t>
+              <a:t>- Purificadores de agua solare</a:t>
             </a:r>
-            <a:r>
-              <a:rPr lang="en-US" dirty="0" err="1">
-                <a:solidFill>
-                  <a:schemeClr val="dk1"/>
-                </a:solidFill>
-                <a:latin typeface="Roboto"/>
-                <a:ea typeface="Roboto"/>
-                <a:cs typeface="Roboto"/>
-                <a:sym typeface="Roboto"/>
-              </a:rPr>
-              <a:t>Purificadores</a:t>
-            </a:r>
-            <a:r>
-              <a:rPr lang="en-US" dirty="0">
-                <a:solidFill>
-                  <a:schemeClr val="dk1"/>
-                </a:solidFill>
-                <a:latin typeface="Roboto"/>
-                <a:ea typeface="Roboto"/>
-                <a:cs typeface="Roboto"/>
-                <a:sym typeface="Roboto"/>
-              </a:rPr>
-              <a:t> de </a:t>
-            </a:r>
-            <a:r>
-              <a:rPr lang="en-US" dirty="0" err="1">
-                <a:solidFill>
-                  <a:schemeClr val="dk1"/>
-                </a:solidFill>
-                <a:latin typeface="Roboto"/>
-                <a:ea typeface="Roboto"/>
-                <a:cs typeface="Roboto"/>
-                <a:sym typeface="Roboto"/>
-              </a:rPr>
-              <a:t>agua</a:t>
-            </a:r>
-            <a:r>
-              <a:rPr lang="en-US" dirty="0">
-                <a:solidFill>
-                  <a:schemeClr val="dk1"/>
-                </a:solidFill>
-                <a:latin typeface="Roboto"/>
-                <a:ea typeface="Roboto"/>
-                <a:cs typeface="Roboto"/>
-                <a:sym typeface="Roboto"/>
-              </a:rPr>
-              <a:t> </a:t>
-            </a:r>
-            <a:r>
-              <a:rPr lang="en-US">
-                <a:solidFill>
-                  <a:schemeClr val="dk1"/>
-                </a:solidFill>
-                <a:latin typeface="Roboto"/>
-                <a:ea typeface="Roboto"/>
-                <a:cs typeface="Roboto"/>
-                <a:sym typeface="Roboto"/>
-              </a:rPr>
-              <a:t>solare</a:t>
-            </a:r>
-            <a:endParaRPr lang="en-US" dirty="0">
-              <a:solidFill>
-                <a:schemeClr val="dk1"/>
-              </a:solidFill>
-              <a:latin typeface="Roboto"/>
-              <a:ea typeface="Roboto"/>
-              <a:cs typeface="Roboto"/>
-              <a:sym typeface="Roboto"/>
-            </a:endParaRPr>
           </a:p>
         </p:txBody>
       </p:sp>
@@ -7660,6 +7228,15 @@
 </file>
 
 <file path=customXml/item1.xml><?xml version="1.0" encoding="utf-8"?>
+<?mso-contentType ?>
+<FormTemplates xmlns="http://schemas.microsoft.com/sharepoint/v3/contenttype/forms">
+  <Display>DocumentLibraryForm</Display>
+  <Edit>DocumentLibraryForm</Edit>
+  <New>DocumentLibraryForm</New>
+</FormTemplates>
+</file>
+
+<file path=customXml/item2.xml><?xml version="1.0" encoding="utf-8"?>
 <p:properties xmlns:p="http://schemas.microsoft.com/office/2006/metadata/properties" xmlns:xsi="http://www.w3.org/2001/XMLSchema-instance" xmlns:pc="http://schemas.microsoft.com/office/infopath/2007/PartnerControls">
   <documentManagement>
     <lcf76f155ced4ddcb4097134ff3c332f xmlns="25b1c2ef-e678-4a48-9aa5-a77ca6777096">
@@ -7668,15 +7245,6 @@
     <TaxCatchAll xmlns="f21410ed-3137-4ad4-a147-f1eb5589437a" xsi:nil="true"/>
   </documentManagement>
 </p:properties>
-</file>
-
-<file path=customXml/item2.xml><?xml version="1.0" encoding="utf-8"?>
-<?mso-contentType ?>
-<FormTemplates xmlns="http://schemas.microsoft.com/sharepoint/v3/contenttype/forms">
-  <Display>DocumentLibraryForm</Display>
-  <Edit>DocumentLibraryForm</Edit>
-  <New>DocumentLibraryForm</New>
-</FormTemplates>
 </file>
 
 <file path=customXml/item3.xml><?xml version="1.0" encoding="utf-8"?>
@@ -7909,20 +7477,20 @@
 </file>
 
 <file path=customXml/itemProps1.xml><?xml version="1.0" encoding="utf-8"?>
+<ds:datastoreItem xmlns:ds="http://schemas.openxmlformats.org/officeDocument/2006/customXml" ds:itemID="{1D28DDFF-CD26-4CEF-A6CF-84D0CE2F741E}">
+  <ds:schemaRefs>
+    <ds:schemaRef ds:uri="http://schemas.microsoft.com/sharepoint/v3/contenttype/forms"/>
+  </ds:schemaRefs>
+</ds:datastoreItem>
+</file>
+
+<file path=customXml/itemProps2.xml><?xml version="1.0" encoding="utf-8"?>
 <ds:datastoreItem xmlns:ds="http://schemas.openxmlformats.org/officeDocument/2006/customXml" ds:itemID="{7288B633-0DE9-4CAD-8E96-F8CF8A640526}">
   <ds:schemaRefs>
     <ds:schemaRef ds:uri="http://schemas.microsoft.com/office/2006/metadata/properties"/>
     <ds:schemaRef ds:uri="http://schemas.microsoft.com/office/infopath/2007/PartnerControls"/>
     <ds:schemaRef ds:uri="25b1c2ef-e678-4a48-9aa5-a77ca6777096"/>
     <ds:schemaRef ds:uri="f21410ed-3137-4ad4-a147-f1eb5589437a"/>
-  </ds:schemaRefs>
-</ds:datastoreItem>
-</file>
-
-<file path=customXml/itemProps2.xml><?xml version="1.0" encoding="utf-8"?>
-<ds:datastoreItem xmlns:ds="http://schemas.openxmlformats.org/officeDocument/2006/customXml" ds:itemID="{1D28DDFF-CD26-4CEF-A6CF-84D0CE2F741E}">
-  <ds:schemaRefs>
-    <ds:schemaRef ds:uri="http://schemas.microsoft.com/sharepoint/v3/contenttype/forms"/>
   </ds:schemaRefs>
 </ds:datastoreItem>
 </file>

</xml_diff>